<commit_message>
Att arquivos aula 5 de IAC
</commit_message>
<xml_diff>
--- a/A.D.S/2020-01/IAC/Aula05_Git pull merge branch.pptx
+++ b/A.D.S/2020-01/IAC/Aula05_Git pull merge branch.pptx
@@ -16,6 +16,7 @@
     <p:sldId id="261" r:id="rId11"/>
     <p:sldId id="262" r:id="rId12"/>
     <p:sldId id="263" r:id="rId13"/>
+    <p:sldId id="264" r:id="rId14"/>
   </p:sldIdLst>
   <p:sldSz cy="5143500" cx="9144000"/>
   <p:notesSz cx="6858000" cy="9144000"/>
@@ -910,7 +911,7 @@
       </p:grpSpPr>
       <p:sp>
         <p:nvSpPr>
-          <p:cNvPr id="64" name="Google Shape;64;g71f7a9a85a_2_0:notes"/>
+          <p:cNvPr id="64" name="Google Shape;64;g71f7a9a85a_2_5:notes"/>
           <p:cNvSpPr/>
           <p:nvPr>
             <p:ph idx="2" type="sldImg"/>
@@ -945,7 +946,7 @@
       </p:sp>
       <p:sp>
         <p:nvSpPr>
-          <p:cNvPr id="65" name="Google Shape;65;g71f7a9a85a_2_0:notes"/>
+          <p:cNvPr id="65" name="Google Shape;65;g71f7a9a85a_2_5:notes"/>
           <p:cNvSpPr txBox="1"/>
           <p:nvPr>
             <p:ph idx="1" type="body"/>
@@ -995,7 +996,7 @@
   <p:cSld>
     <p:spTree>
       <p:nvGrpSpPr>
-        <p:cNvPr id="68" name="Shape 68"/>
+        <p:cNvPr id="69" name="Shape 69"/>
         <p:cNvGrpSpPr/>
         <p:nvPr/>
       </p:nvGrpSpPr>
@@ -1009,7 +1010,7 @@
       </p:grpSpPr>
       <p:sp>
         <p:nvSpPr>
-          <p:cNvPr id="69" name="Google Shape;69;g7f34a613d6_0_11:notes"/>
+          <p:cNvPr id="70" name="Google Shape;70;g71f7a9a85a_2_0:notes"/>
           <p:cNvSpPr/>
           <p:nvPr>
             <p:ph idx="2" type="sldImg"/>
@@ -1044,7 +1045,7 @@
       </p:sp>
       <p:sp>
         <p:nvSpPr>
-          <p:cNvPr id="70" name="Google Shape;70;g7f34a613d6_0_11:notes"/>
+          <p:cNvPr id="71" name="Google Shape;71;g71f7a9a85a_2_0:notes"/>
           <p:cNvSpPr txBox="1"/>
           <p:nvPr>
             <p:ph idx="1" type="body"/>
@@ -1108,7 +1109,7 @@
       </p:grpSpPr>
       <p:sp>
         <p:nvSpPr>
-          <p:cNvPr id="75" name="Google Shape;75;g7185014978_0_1:notes"/>
+          <p:cNvPr id="75" name="Google Shape;75;g7f34a613d6_0_11:notes"/>
           <p:cNvSpPr/>
           <p:nvPr>
             <p:ph idx="2" type="sldImg"/>
@@ -1143,7 +1144,7 @@
       </p:sp>
       <p:sp>
         <p:nvSpPr>
-          <p:cNvPr id="76" name="Google Shape;76;g7185014978_0_1:notes"/>
+          <p:cNvPr id="76" name="Google Shape;76;g7f34a613d6_0_11:notes"/>
           <p:cNvSpPr txBox="1"/>
           <p:nvPr>
             <p:ph idx="1" type="body"/>
@@ -1207,7 +1208,7 @@
       </p:grpSpPr>
       <p:sp>
         <p:nvSpPr>
-          <p:cNvPr id="81" name="Google Shape;81;g7f34a613d6_55_0:notes"/>
+          <p:cNvPr id="81" name="Google Shape;81;g7185014978_0_1:notes"/>
           <p:cNvSpPr/>
           <p:nvPr>
             <p:ph idx="2" type="sldImg"/>
@@ -1242,7 +1243,7 @@
       </p:sp>
       <p:sp>
         <p:nvSpPr>
-          <p:cNvPr id="82" name="Google Shape;82;g7f34a613d6_55_0:notes"/>
+          <p:cNvPr id="82" name="Google Shape;82;g7185014978_0_1:notes"/>
           <p:cNvSpPr txBox="1"/>
           <p:nvPr>
             <p:ph idx="1" type="body"/>
@@ -1306,7 +1307,7 @@
       </p:grpSpPr>
       <p:sp>
         <p:nvSpPr>
-          <p:cNvPr id="87" name="Google Shape;87;g7f34a613d6_0_33:notes"/>
+          <p:cNvPr id="87" name="Google Shape;87;g7f34a613d6_55_0:notes"/>
           <p:cNvSpPr/>
           <p:nvPr>
             <p:ph idx="2" type="sldImg"/>
@@ -1341,7 +1342,7 @@
       </p:sp>
       <p:sp>
         <p:nvSpPr>
-          <p:cNvPr id="88" name="Google Shape;88;g7f34a613d6_0_33:notes"/>
+          <p:cNvPr id="88" name="Google Shape;88;g7f34a613d6_55_0:notes"/>
           <p:cNvSpPr txBox="1"/>
           <p:nvPr>
             <p:ph idx="1" type="body"/>
@@ -1405,7 +1406,7 @@
       </p:grpSpPr>
       <p:sp>
         <p:nvSpPr>
-          <p:cNvPr id="93" name="Google Shape;93;g7f34a613d6_0_28:notes"/>
+          <p:cNvPr id="93" name="Google Shape;93;g7f34a613d6_0_33:notes"/>
           <p:cNvSpPr/>
           <p:nvPr>
             <p:ph idx="2" type="sldImg"/>
@@ -1440,7 +1441,106 @@
       </p:sp>
       <p:sp>
         <p:nvSpPr>
-          <p:cNvPr id="94" name="Google Shape;94;g7f34a613d6_0_28:notes"/>
+          <p:cNvPr id="94" name="Google Shape;94;g7f34a613d6_0_33:notes"/>
+          <p:cNvSpPr txBox="1"/>
+          <p:nvPr>
+            <p:ph idx="1" type="body"/>
+          </p:nvPr>
+        </p:nvSpPr>
+        <p:spPr>
+          <a:xfrm>
+            <a:off x="685800" y="4343400"/>
+            <a:ext cx="5486400" cy="4114800"/>
+          </a:xfrm>
+          <a:prstGeom prst="rect">
+            <a:avLst/>
+          </a:prstGeom>
+        </p:spPr>
+        <p:txBody>
+          <a:bodyPr anchorCtr="0" anchor="t" bIns="91425" lIns="91425" spcFirstLastPara="1" rIns="91425" wrap="square" tIns="91425">
+            <a:noAutofit/>
+          </a:bodyPr>
+          <a:lstStyle/>
+          <a:p>
+            <a:pPr indent="0" lvl="0" marL="0" rtl="0" algn="l">
+              <a:spcBef>
+                <a:spcPts val="0"/>
+              </a:spcBef>
+              <a:spcAft>
+                <a:spcPts val="0"/>
+              </a:spcAft>
+              <a:buNone/>
+            </a:pPr>
+            <a:r>
+              <a:t/>
+            </a:r>
+            <a:endParaRPr/>
+          </a:p>
+        </p:txBody>
+      </p:sp>
+    </p:spTree>
+  </p:cSld>
+  <p:clrMapOvr>
+    <a:masterClrMapping/>
+  </p:clrMapOvr>
+</p:notes>
+</file>
+
+<file path=ppt/notesSlides/notesSlide9.xml><?xml version="1.0" encoding="utf-8"?>
+<p:notes xmlns:a="http://schemas.openxmlformats.org/drawingml/2006/main" xmlns:r="http://schemas.openxmlformats.org/officeDocument/2006/relationships" xmlns:mc="http://schemas.openxmlformats.org/markup-compatibility/2006" xmlns:mv="urn:schemas-microsoft-com:mac:vml" xmlns:p="http://schemas.openxmlformats.org/presentationml/2006/main" xmlns:c="http://schemas.openxmlformats.org/drawingml/2006/chart" xmlns:dgm="http://schemas.openxmlformats.org/drawingml/2006/diagram" xmlns:o="urn:schemas-microsoft-com:office:office" xmlns:v="urn:schemas-microsoft-com:vml" xmlns:pvml="urn:schemas-microsoft-com:office:powerpoint" xmlns:com="http://schemas.openxmlformats.org/drawingml/2006/compatibility" xmlns:p14="http://schemas.microsoft.com/office/powerpoint/2010/main" xmlns:p15="http://schemas.microsoft.com/office/powerpoint/2012/main" showMasterPhAnim="0" showMasterSp="0">
+  <p:cSld>
+    <p:spTree>
+      <p:nvGrpSpPr>
+        <p:cNvPr id="98" name="Shape 98"/>
+        <p:cNvGrpSpPr/>
+        <p:nvPr/>
+      </p:nvGrpSpPr>
+      <p:grpSpPr>
+        <a:xfrm>
+          <a:off x="0" y="0"/>
+          <a:ext cx="0" cy="0"/>
+          <a:chOff x="0" y="0"/>
+          <a:chExt cx="0" cy="0"/>
+        </a:xfrm>
+      </p:grpSpPr>
+      <p:sp>
+        <p:nvSpPr>
+          <p:cNvPr id="99" name="Google Shape;99;g7f34a613d6_0_28:notes"/>
+          <p:cNvSpPr/>
+          <p:nvPr>
+            <p:ph idx="2" type="sldImg"/>
+          </p:nvPr>
+        </p:nvSpPr>
+        <p:spPr>
+          <a:xfrm>
+            <a:off x="381300" y="685800"/>
+            <a:ext cx="6096000" cy="3429000"/>
+          </a:xfrm>
+          <a:custGeom>
+            <a:rect b="b" l="l" r="r" t="t"/>
+            <a:pathLst>
+              <a:path extrusionOk="0" h="120000" w="120000">
+                <a:moveTo>
+                  <a:pt x="0" y="0"/>
+                </a:moveTo>
+                <a:lnTo>
+                  <a:pt x="120000" y="0"/>
+                </a:lnTo>
+                <a:lnTo>
+                  <a:pt x="120000" y="120000"/>
+                </a:lnTo>
+                <a:lnTo>
+                  <a:pt x="0" y="120000"/>
+                </a:lnTo>
+                <a:close/>
+              </a:path>
+            </a:pathLst>
+          </a:custGeom>
+        </p:spPr>
+      </p:sp>
+      <p:sp>
+        <p:nvSpPr>
+          <p:cNvPr id="100" name="Google Shape;100;g7f34a613d6_0_28:notes"/>
           <p:cNvSpPr txBox="1"/>
           <p:nvPr>
             <p:ph idx="1" type="body"/>
@@ -6418,6 +6518,111 @@
           <p:cNvPr id="67" name="Google Shape;67;p15"/>
           <p:cNvSpPr txBox="1"/>
           <p:nvPr>
+            <p:ph type="ctrTitle"/>
+          </p:nvPr>
+        </p:nvSpPr>
+        <p:spPr>
+          <a:xfrm>
+            <a:off x="311708" y="744575"/>
+            <a:ext cx="8520600" cy="2052600"/>
+          </a:xfrm>
+          <a:prstGeom prst="rect">
+            <a:avLst/>
+          </a:prstGeom>
+        </p:spPr>
+        <p:txBody>
+          <a:bodyPr anchorCtr="0" anchor="b" bIns="91425" lIns="91425" spcFirstLastPara="1" rIns="91425" wrap="square" tIns="91425">
+            <a:noAutofit/>
+          </a:bodyPr>
+          <a:lstStyle/>
+          <a:p>
+            <a:pPr indent="0" lvl="0" marL="0" rtl="0" algn="ctr">
+              <a:spcBef>
+                <a:spcPts val="0"/>
+              </a:spcBef>
+              <a:spcAft>
+                <a:spcPts val="0"/>
+              </a:spcAft>
+              <a:buNone/>
+            </a:pPr>
+            <a:r>
+              <a:rPr lang="pt-BR"/>
+              <a:t>voltaremos</a:t>
+            </a:r>
+            <a:endParaRPr/>
+          </a:p>
+        </p:txBody>
+      </p:sp>
+      <p:sp>
+        <p:nvSpPr>
+          <p:cNvPr id="68" name="Google Shape;68;p15"/>
+          <p:cNvSpPr txBox="1"/>
+          <p:nvPr>
+            <p:ph idx="1" type="subTitle"/>
+          </p:nvPr>
+        </p:nvSpPr>
+        <p:spPr>
+          <a:xfrm>
+            <a:off x="311700" y="2834125"/>
+            <a:ext cx="8520600" cy="792600"/>
+          </a:xfrm>
+          <a:prstGeom prst="rect">
+            <a:avLst/>
+          </a:prstGeom>
+        </p:spPr>
+        <p:txBody>
+          <a:bodyPr anchorCtr="0" anchor="t" bIns="91425" lIns="91425" spcFirstLastPara="1" rIns="91425" wrap="square" tIns="91425">
+            <a:noAutofit/>
+          </a:bodyPr>
+          <a:lstStyle/>
+          <a:p>
+            <a:pPr indent="0" lvl="0" marL="0" rtl="0" algn="ctr">
+              <a:spcBef>
+                <a:spcPts val="0"/>
+              </a:spcBef>
+              <a:spcAft>
+                <a:spcPts val="0"/>
+              </a:spcAft>
+              <a:buNone/>
+            </a:pPr>
+            <a:r>
+              <a:rPr lang="pt-BR"/>
+              <a:t>20:55hs</a:t>
+            </a:r>
+            <a:endParaRPr/>
+          </a:p>
+        </p:txBody>
+      </p:sp>
+    </p:spTree>
+  </p:cSld>
+  <p:clrMapOvr>
+    <a:masterClrMapping/>
+  </p:clrMapOvr>
+</p:sld>
+</file>
+
+<file path=ppt/slides/slide4.xml><?xml version="1.0" encoding="utf-8"?>
+<p:sld xmlns:a="http://schemas.openxmlformats.org/drawingml/2006/main" xmlns:r="http://schemas.openxmlformats.org/officeDocument/2006/relationships" xmlns:mc="http://schemas.openxmlformats.org/markup-compatibility/2006" xmlns:mv="urn:schemas-microsoft-com:mac:vml" xmlns:p="http://schemas.openxmlformats.org/presentationml/2006/main" xmlns:c="http://schemas.openxmlformats.org/drawingml/2006/chart" xmlns:dgm="http://schemas.openxmlformats.org/drawingml/2006/diagram" xmlns:o="urn:schemas-microsoft-com:office:office" xmlns:v="urn:schemas-microsoft-com:vml" xmlns:pvml="urn:schemas-microsoft-com:office:powerpoint" xmlns:com="http://schemas.openxmlformats.org/drawingml/2006/compatibility" xmlns:p14="http://schemas.microsoft.com/office/powerpoint/2010/main" xmlns:p15="http://schemas.microsoft.com/office/powerpoint/2012/main">
+  <p:cSld>
+    <p:spTree>
+      <p:nvGrpSpPr>
+        <p:cNvPr id="72" name="Shape 72"/>
+        <p:cNvGrpSpPr/>
+        <p:nvPr/>
+      </p:nvGrpSpPr>
+      <p:grpSpPr>
+        <a:xfrm>
+          <a:off x="0" y="0"/>
+          <a:ext cx="0" cy="0"/>
+          <a:chOff x="0" y="0"/>
+          <a:chExt cx="0" cy="0"/>
+        </a:xfrm>
+      </p:grpSpPr>
+      <p:sp>
+        <p:nvSpPr>
+          <p:cNvPr id="73" name="Google Shape;73;p16"/>
+          <p:cNvSpPr txBox="1"/>
+          <p:nvPr>
             <p:ph idx="1" type="subTitle"/>
           </p:nvPr>
         </p:nvSpPr>
@@ -6448,228 +6653,6 @@
             <a:r>
               <a:rPr lang="pt-BR"/>
               <a:t>Se eu sei o conceito do git e sei utilizar ele no terminal, eu consigo usar em qualquer ambiente.</a:t>
-            </a:r>
-            <a:endParaRPr/>
-          </a:p>
-        </p:txBody>
-      </p:sp>
-    </p:spTree>
-  </p:cSld>
-  <p:clrMapOvr>
-    <a:masterClrMapping/>
-  </p:clrMapOvr>
-</p:sld>
-</file>
-
-<file path=ppt/slides/slide4.xml><?xml version="1.0" encoding="utf-8"?>
-<p:sld xmlns:a="http://schemas.openxmlformats.org/drawingml/2006/main" xmlns:r="http://schemas.openxmlformats.org/officeDocument/2006/relationships" xmlns:mc="http://schemas.openxmlformats.org/markup-compatibility/2006" xmlns:mv="urn:schemas-microsoft-com:mac:vml" xmlns:p="http://schemas.openxmlformats.org/presentationml/2006/main" xmlns:c="http://schemas.openxmlformats.org/drawingml/2006/chart" xmlns:dgm="http://schemas.openxmlformats.org/drawingml/2006/diagram" xmlns:o="urn:schemas-microsoft-com:office:office" xmlns:v="urn:schemas-microsoft-com:vml" xmlns:pvml="urn:schemas-microsoft-com:office:powerpoint" xmlns:com="http://schemas.openxmlformats.org/drawingml/2006/compatibility" xmlns:p14="http://schemas.microsoft.com/office/powerpoint/2010/main" xmlns:p15="http://schemas.microsoft.com/office/powerpoint/2012/main">
-  <p:cSld>
-    <p:spTree>
-      <p:nvGrpSpPr>
-        <p:cNvPr id="71" name="Shape 71"/>
-        <p:cNvGrpSpPr/>
-        <p:nvPr/>
-      </p:nvGrpSpPr>
-      <p:grpSpPr>
-        <a:xfrm>
-          <a:off x="0" y="0"/>
-          <a:ext cx="0" cy="0"/>
-          <a:chOff x="0" y="0"/>
-          <a:chExt cx="0" cy="0"/>
-        </a:xfrm>
-      </p:grpSpPr>
-      <p:sp>
-        <p:nvSpPr>
-          <p:cNvPr id="72" name="Google Shape;72;p16"/>
-          <p:cNvSpPr txBox="1"/>
-          <p:nvPr>
-            <p:ph type="title"/>
-          </p:nvPr>
-        </p:nvSpPr>
-        <p:spPr>
-          <a:xfrm>
-            <a:off x="311700" y="445025"/>
-            <a:ext cx="8520600" cy="572700"/>
-          </a:xfrm>
-          <a:prstGeom prst="rect">
-            <a:avLst/>
-          </a:prstGeom>
-        </p:spPr>
-        <p:txBody>
-          <a:bodyPr anchorCtr="0" anchor="t" bIns="91425" lIns="91425" spcFirstLastPara="1" rIns="91425" wrap="square" tIns="91425">
-            <a:noAutofit/>
-          </a:bodyPr>
-          <a:lstStyle/>
-          <a:p>
-            <a:pPr indent="0" lvl="0" marL="0" rtl="0" algn="l">
-              <a:spcBef>
-                <a:spcPts val="0"/>
-              </a:spcBef>
-              <a:spcAft>
-                <a:spcPts val="0"/>
-              </a:spcAft>
-              <a:buNone/>
-            </a:pPr>
-            <a:r>
-              <a:rPr lang="pt-BR"/>
-              <a:t>Revisão: comandos importantes</a:t>
-            </a:r>
-            <a:endParaRPr/>
-          </a:p>
-        </p:txBody>
-      </p:sp>
-      <p:sp>
-        <p:nvSpPr>
-          <p:cNvPr id="73" name="Google Shape;73;p16"/>
-          <p:cNvSpPr txBox="1"/>
-          <p:nvPr>
-            <p:ph idx="1" type="body"/>
-          </p:nvPr>
-        </p:nvSpPr>
-        <p:spPr>
-          <a:xfrm>
-            <a:off x="311700" y="1152475"/>
-            <a:ext cx="8520600" cy="3416400"/>
-          </a:xfrm>
-          <a:prstGeom prst="rect">
-            <a:avLst/>
-          </a:prstGeom>
-        </p:spPr>
-        <p:txBody>
-          <a:bodyPr anchorCtr="0" anchor="t" bIns="91425" lIns="91425" spcFirstLastPara="1" rIns="91425" wrap="square" tIns="91425">
-            <a:noAutofit/>
-          </a:bodyPr>
-          <a:lstStyle/>
-          <a:p>
-            <a:pPr indent="0" lvl="0" marL="0" rtl="0" algn="l">
-              <a:spcBef>
-                <a:spcPts val="0"/>
-              </a:spcBef>
-              <a:spcAft>
-                <a:spcPts val="0"/>
-              </a:spcAft>
-              <a:buNone/>
-            </a:pPr>
-            <a:r>
-              <a:rPr b="1" lang="pt-BR">
-                <a:latin typeface="Courier New"/>
-                <a:ea typeface="Courier New"/>
-                <a:cs typeface="Courier New"/>
-                <a:sym typeface="Courier New"/>
-              </a:rPr>
-              <a:t>Git status</a:t>
-            </a:r>
-            <a:r>
-              <a:rPr lang="pt-BR">
-                <a:latin typeface="Courier New"/>
-                <a:ea typeface="Courier New"/>
-                <a:cs typeface="Courier New"/>
-                <a:sym typeface="Courier New"/>
-              </a:rPr>
-              <a:t> -</a:t>
-            </a:r>
-            <a:r>
-              <a:rPr lang="pt-BR"/>
-              <a:t> me mostra quais arquivos foram alterados e também situação atual do repo local.</a:t>
-            </a:r>
-            <a:endParaRPr/>
-          </a:p>
-          <a:p>
-            <a:pPr indent="0" lvl="0" marL="0" rtl="0" algn="l">
-              <a:spcBef>
-                <a:spcPts val="1600"/>
-              </a:spcBef>
-              <a:spcAft>
-                <a:spcPts val="0"/>
-              </a:spcAft>
-              <a:buNone/>
-            </a:pPr>
-            <a:r>
-              <a:t/>
-            </a:r>
-            <a:endParaRPr/>
-          </a:p>
-          <a:p>
-            <a:pPr indent="0" lvl="0" marL="0" rtl="0" algn="l">
-              <a:spcBef>
-                <a:spcPts val="1600"/>
-              </a:spcBef>
-              <a:spcAft>
-                <a:spcPts val="0"/>
-              </a:spcAft>
-              <a:buNone/>
-            </a:pPr>
-            <a:r>
-              <a:rPr b="1" lang="pt-BR">
-                <a:latin typeface="Courier New"/>
-                <a:ea typeface="Courier New"/>
-                <a:cs typeface="Courier New"/>
-                <a:sym typeface="Courier New"/>
-              </a:rPr>
-              <a:t>git add</a:t>
-            </a:r>
-            <a:r>
-              <a:rPr lang="pt-BR"/>
-              <a:t> nome do arquivo (enter) ou git add . (para varios arquivos)</a:t>
-            </a:r>
-            <a:endParaRPr/>
-          </a:p>
-          <a:p>
-            <a:pPr indent="0" lvl="0" marL="0" rtl="0" algn="l">
-              <a:spcBef>
-                <a:spcPts val="1600"/>
-              </a:spcBef>
-              <a:spcAft>
-                <a:spcPts val="0"/>
-              </a:spcAft>
-              <a:buNone/>
-            </a:pPr>
-            <a:r>
-              <a:rPr b="1" lang="pt-BR">
-                <a:latin typeface="Courier New"/>
-                <a:ea typeface="Courier New"/>
-                <a:cs typeface="Courier New"/>
-                <a:sym typeface="Courier New"/>
-              </a:rPr>
-              <a:t>git commit -m</a:t>
-            </a:r>
-            <a:r>
-              <a:rPr lang="pt-BR">
-                <a:latin typeface="Courier New"/>
-                <a:ea typeface="Courier New"/>
-                <a:cs typeface="Courier New"/>
-                <a:sym typeface="Courier New"/>
-              </a:rPr>
-              <a:t> </a:t>
-            </a:r>
-            <a:r>
-              <a:rPr lang="pt-BR"/>
-              <a:t>“a mensagem do que está sendo enviado” (Enter)</a:t>
-            </a:r>
-            <a:endParaRPr/>
-          </a:p>
-          <a:p>
-            <a:pPr indent="0" lvl="0" marL="0" rtl="0" algn="l">
-              <a:spcBef>
-                <a:spcPts val="1600"/>
-              </a:spcBef>
-              <a:spcAft>
-                <a:spcPts val="1600"/>
-              </a:spcAft>
-              <a:buNone/>
-            </a:pPr>
-            <a:r>
-              <a:rPr b="1" lang="pt-BR">
-                <a:latin typeface="Courier New"/>
-                <a:ea typeface="Courier New"/>
-                <a:cs typeface="Courier New"/>
-                <a:sym typeface="Courier New"/>
-              </a:rPr>
-              <a:t>git push </a:t>
-            </a:r>
-            <a:r>
-              <a:rPr lang="pt-BR"/>
-              <a:t>- envia as alterações (commit) para o repositório remoto. (enter)</a:t>
             </a:r>
             <a:endParaRPr/>
           </a:p>
@@ -6734,7 +6717,7 @@
             </a:pPr>
             <a:r>
               <a:rPr lang="pt-BR"/>
-              <a:t>Git Pull</a:t>
+              <a:t>Revisão: comandos importantes</a:t>
             </a:r>
             <a:endParaRPr/>
           </a:p>
@@ -6763,28 +6746,41 @@
           </a:bodyPr>
           <a:lstStyle/>
           <a:p>
-            <a:pPr indent="-342900" lvl="0" marL="457200" rtl="0" algn="l">
-              <a:spcBef>
-                <a:spcPts val="0"/>
-              </a:spcBef>
-              <a:spcAft>
-                <a:spcPts val="0"/>
-              </a:spcAft>
-              <a:buSzPts val="1800"/>
-              <a:buChar char="●"/>
+            <a:pPr indent="0" lvl="0" marL="0" rtl="0" algn="l">
+              <a:spcBef>
+                <a:spcPts val="0"/>
+              </a:spcBef>
+              <a:spcAft>
+                <a:spcPts val="0"/>
+              </a:spcAft>
+              <a:buNone/>
             </a:pPr>
             <a:r>
-              <a:rPr lang="pt-BR"/>
-              <a:t>E</a:t>
+              <a:rPr b="1" lang="pt-BR">
+                <a:latin typeface="Courier New"/>
+                <a:ea typeface="Courier New"/>
+                <a:cs typeface="Courier New"/>
+                <a:sym typeface="Courier New"/>
+              </a:rPr>
+              <a:t>Git status</a:t>
+            </a:r>
+            <a:r>
+              <a:rPr lang="pt-BR">
+                <a:latin typeface="Courier New"/>
+                <a:ea typeface="Courier New"/>
+                <a:cs typeface="Courier New"/>
+                <a:sym typeface="Courier New"/>
+              </a:rPr>
+              <a:t> -</a:t>
             </a:r>
             <a:r>
               <a:rPr lang="pt-BR"/>
-              <a:t>le é usado para trazer todas as modificações que estão no repositório remoto (github) para o seu projeto local. </a:t>
+              <a:t> me mostra quais arquivos foram alterados e também situação atual do repo local.</a:t>
             </a:r>
             <a:endParaRPr/>
           </a:p>
           <a:p>
-            <a:pPr indent="0" lvl="0" marL="457200" rtl="0" algn="l">
+            <a:pPr indent="0" lvl="0" marL="0" rtl="0" algn="l">
               <a:spcBef>
                 <a:spcPts val="1600"/>
               </a:spcBef>
@@ -6799,23 +6795,27 @@
             <a:endParaRPr/>
           </a:p>
           <a:p>
-            <a:pPr indent="-342900" lvl="0" marL="457200" rtl="0" algn="l">
-              <a:spcBef>
-                <a:spcPts val="1600"/>
-              </a:spcBef>
-              <a:spcAft>
-                <a:spcPts val="0"/>
-              </a:spcAft>
-              <a:buSzPts val="1800"/>
-              <a:buChar char="●"/>
+            <a:pPr indent="0" lvl="0" marL="0" rtl="0" algn="l">
+              <a:spcBef>
+                <a:spcPts val="1600"/>
+              </a:spcBef>
+              <a:spcAft>
+                <a:spcPts val="0"/>
+              </a:spcAft>
+              <a:buNone/>
             </a:pPr>
             <a:r>
-              <a:rPr lang="pt-BR"/>
-              <a:t>Isso é vital quando existem projetos mantidos por mais de uma pessoa, ou se você possui duas máquinas e precisa manter a sincronia entre ela</a:t>
+              <a:rPr b="1" lang="pt-BR">
+                <a:latin typeface="Courier New"/>
+                <a:ea typeface="Courier New"/>
+                <a:cs typeface="Courier New"/>
+                <a:sym typeface="Courier New"/>
+              </a:rPr>
+              <a:t>git add</a:t>
             </a:r>
             <a:r>
               <a:rPr lang="pt-BR"/>
-              <a:t>s</a:t>
+              <a:t> nome do arquivo (enter) ou git add . (para varios arquivos)</a:t>
             </a:r>
             <a:endParaRPr/>
           </a:p>
@@ -6825,12 +6825,56 @@
                 <a:spcPts val="1600"/>
               </a:spcBef>
               <a:spcAft>
-                <a:spcPts val="1600"/>
+                <a:spcPts val="0"/>
               </a:spcAft>
               <a:buNone/>
             </a:pPr>
             <a:r>
-              <a:t/>
+              <a:rPr b="1" lang="pt-BR">
+                <a:latin typeface="Courier New"/>
+                <a:ea typeface="Courier New"/>
+                <a:cs typeface="Courier New"/>
+                <a:sym typeface="Courier New"/>
+              </a:rPr>
+              <a:t>git commit -m</a:t>
+            </a:r>
+            <a:r>
+              <a:rPr lang="pt-BR">
+                <a:latin typeface="Courier New"/>
+                <a:ea typeface="Courier New"/>
+                <a:cs typeface="Courier New"/>
+                <a:sym typeface="Courier New"/>
+              </a:rPr>
+              <a:t> </a:t>
+            </a:r>
+            <a:r>
+              <a:rPr lang="pt-BR"/>
+              <a:t>“a mensagem do que está sendo enviado” (Enter)</a:t>
+            </a:r>
+            <a:endParaRPr/>
+          </a:p>
+          <a:p>
+            <a:pPr indent="0" lvl="0" marL="0" rtl="0" algn="l">
+              <a:spcBef>
+                <a:spcPts val="1600"/>
+              </a:spcBef>
+              <a:spcAft>
+                <a:spcPts val="1600"/>
+              </a:spcAft>
+              <a:buNone/>
+            </a:pPr>
+            <a:r>
+              <a:rPr b="1" lang="pt-BR">
+                <a:latin typeface="Courier New"/>
+                <a:ea typeface="Courier New"/>
+                <a:cs typeface="Courier New"/>
+                <a:sym typeface="Courier New"/>
+              </a:rPr>
+              <a:t>git push </a:t>
+            </a:r>
+            <a:r>
+              <a:rPr lang="pt-BR"/>
+              <a:t>- envia as alterações (commit) para o repositório remoto. (enter)</a:t>
             </a:r>
             <a:endParaRPr/>
           </a:p>
@@ -6891,51 +6935,11 @@
               <a:spcAft>
                 <a:spcPts val="0"/>
               </a:spcAft>
-              <a:buClr>
-                <a:schemeClr val="dk1"/>
-              </a:buClr>
-              <a:buSzPts val="1100"/>
-              <a:buFont typeface="Arial"/>
               <a:buNone/>
             </a:pPr>
             <a:r>
               <a:rPr lang="pt-BR"/>
-              <a:t>Trabalhando com branches</a:t>
-            </a:r>
-            <a:endParaRPr/>
-          </a:p>
-          <a:p>
-            <a:pPr indent="0" lvl="0" marL="0" rtl="0" algn="l">
-              <a:spcBef>
-                <a:spcPts val="0"/>
-              </a:spcBef>
-              <a:spcAft>
-                <a:spcPts val="0"/>
-              </a:spcAft>
-              <a:buClr>
-                <a:schemeClr val="dk1"/>
-              </a:buClr>
-              <a:buSzPts val="1100"/>
-              <a:buFont typeface="Arial"/>
-              <a:buNone/>
-            </a:pPr>
-            <a:r>
-              <a:t/>
-            </a:r>
-            <a:endParaRPr sz="1100"/>
-          </a:p>
-          <a:p>
-            <a:pPr indent="0" lvl="0" marL="0" rtl="0" algn="l">
-              <a:spcBef>
-                <a:spcPts val="0"/>
-              </a:spcBef>
-              <a:spcAft>
-                <a:spcPts val="0"/>
-              </a:spcAft>
-              <a:buNone/>
-            </a:pPr>
-            <a:r>
-              <a:t/>
+              <a:t>Git Pull</a:t>
             </a:r>
             <a:endParaRPr/>
           </a:p>
@@ -6952,7 +6956,7 @@
         <p:spPr>
           <a:xfrm>
             <a:off x="311700" y="1152475"/>
-            <a:ext cx="8520600" cy="3920400"/>
+            <a:ext cx="8520600" cy="3416400"/>
           </a:xfrm>
           <a:prstGeom prst="rect">
             <a:avLst/>
@@ -6975,109 +6979,50 @@
               <a:buChar char="●"/>
             </a:pPr>
             <a:r>
-              <a:rPr lang="pt-BR">
-                <a:solidFill>
-                  <a:schemeClr val="dk1"/>
-                </a:solidFill>
-              </a:rPr>
-              <a:t> Ramificar o seu projeto em 2 ou mais.</a:t>
+              <a:rPr lang="pt-BR"/>
+              <a:t>E</a:t>
             </a:r>
-            <a:br>
-              <a:rPr lang="pt-BR">
-                <a:solidFill>
-                  <a:schemeClr val="dk1"/>
-                </a:solidFill>
-              </a:rPr>
-            </a:br>
-            <a:endParaRPr>
-              <a:solidFill>
-                <a:schemeClr val="dk1"/>
-              </a:solidFill>
-            </a:endParaRPr>
+            <a:r>
+              <a:rPr lang="pt-BR"/>
+              <a:t>le é usado para trazer todas as modificações que estão no repositório remoto (github) para o seu projeto local. </a:t>
+            </a:r>
+            <a:endParaRPr/>
+          </a:p>
+          <a:p>
+            <a:pPr indent="0" lvl="0" marL="457200" rtl="0" algn="l">
+              <a:spcBef>
+                <a:spcPts val="1600"/>
+              </a:spcBef>
+              <a:spcAft>
+                <a:spcPts val="0"/>
+              </a:spcAft>
+              <a:buNone/>
+            </a:pPr>
+            <a:r>
+              <a:t/>
+            </a:r>
+            <a:endParaRPr/>
           </a:p>
           <a:p>
             <a:pPr indent="-342900" lvl="0" marL="457200" rtl="0" algn="l">
               <a:spcBef>
-                <a:spcPts val="0"/>
-              </a:spcBef>
-              <a:spcAft>
-                <a:spcPts val="0"/>
-              </a:spcAft>
-              <a:buClr>
-                <a:schemeClr val="dk1"/>
-              </a:buClr>
+                <a:spcPts val="1600"/>
+              </a:spcBef>
+              <a:spcAft>
+                <a:spcPts val="0"/>
+              </a:spcAft>
               <a:buSzPts val="1800"/>
               <a:buChar char="●"/>
             </a:pPr>
             <a:r>
-              <a:rPr lang="pt-BR">
-                <a:solidFill>
-                  <a:schemeClr val="dk1"/>
-                </a:solidFill>
-              </a:rPr>
-              <a:t>Imagine que o seu site está pronto, tudo funcionando perfeitamente, mas surge a necessidade de alterar algumas partes dele como forma de melhorá-lo.</a:t>
+              <a:rPr lang="pt-BR"/>
+              <a:t>Isso é vital quando existem projetos mantidos por mais de uma pessoa, ou se você possui duas máquinas e precisa manter a sincronia entre ela</a:t>
             </a:r>
-            <a:endParaRPr>
-              <a:solidFill>
-                <a:schemeClr val="dk1"/>
-              </a:solidFill>
-            </a:endParaRPr>
-          </a:p>
-          <a:p>
-            <a:pPr indent="-342900" lvl="0" marL="457200" rtl="0" algn="l">
-              <a:spcBef>
-                <a:spcPts val="0"/>
-              </a:spcBef>
-              <a:spcAft>
-                <a:spcPts val="0"/>
-              </a:spcAft>
-              <a:buClr>
-                <a:schemeClr val="dk1"/>
-              </a:buClr>
-              <a:buSzPts val="1800"/>
-              <a:buChar char="●"/>
-            </a:pPr>
             <a:r>
-              <a:rPr lang="pt-BR">
-                <a:solidFill>
-                  <a:schemeClr val="dk1"/>
-                </a:solidFill>
-              </a:rPr>
-              <a:t>Você precisa manter estas alterações tanto no computador de casa quanto do trabalho.</a:t>
+              <a:rPr lang="pt-BR"/>
+              <a:t>s</a:t>
             </a:r>
-            <a:endParaRPr>
-              <a:solidFill>
-                <a:schemeClr val="dk1"/>
-              </a:solidFill>
-            </a:endParaRPr>
-          </a:p>
-          <a:p>
-            <a:pPr indent="-342900" lvl="0" marL="457200" rtl="0" algn="l">
-              <a:spcBef>
-                <a:spcPts val="0"/>
-              </a:spcBef>
-              <a:spcAft>
-                <a:spcPts val="0"/>
-              </a:spcAft>
-              <a:buClr>
-                <a:schemeClr val="dk1"/>
-              </a:buClr>
-              <a:buSzPts val="1800"/>
-              <a:buChar char="●"/>
-            </a:pPr>
-            <a:r>
-              <a:rPr lang="pt-BR">
-                <a:solidFill>
-                  <a:schemeClr val="dk1"/>
-                </a:solidFill>
-              </a:rPr>
-              <a:t>Com isso temos um problema, se você começa a alterar os arquivos em casa, para na metade da implementação, e precisa terminar no trabalho, como você iria comitar tudo pela metade e deixar o site incompleto?</a:t>
-            </a:r>
-            <a:endParaRPr>
-              <a:solidFill>
-                <a:schemeClr val="dk1"/>
-              </a:solidFill>
-            </a:endParaRPr>
+            <a:endParaRPr/>
           </a:p>
           <a:p>
             <a:pPr indent="0" lvl="0" marL="0" rtl="0" algn="l">
@@ -7092,7 +7037,7 @@
             <a:r>
               <a:t/>
             </a:r>
-            <a:endParaRPr b="1"/>
+            <a:endParaRPr/>
           </a:p>
         </p:txBody>
       </p:sp>
@@ -7160,9 +7105,29 @@
             </a:pPr>
             <a:r>
               <a:rPr lang="pt-BR"/>
-              <a:t>Como criar Branches</a:t>
+              <a:t>Trabalhando com branches</a:t>
             </a:r>
             <a:endParaRPr/>
+          </a:p>
+          <a:p>
+            <a:pPr indent="0" lvl="0" marL="0" rtl="0" algn="l">
+              <a:spcBef>
+                <a:spcPts val="0"/>
+              </a:spcBef>
+              <a:spcAft>
+                <a:spcPts val="0"/>
+              </a:spcAft>
+              <a:buClr>
+                <a:schemeClr val="dk1"/>
+              </a:buClr>
+              <a:buSzPts val="1100"/>
+              <a:buFont typeface="Arial"/>
+              <a:buNone/>
+            </a:pPr>
+            <a:r>
+              <a:t/>
+            </a:r>
+            <a:endParaRPr sz="1100"/>
           </a:p>
           <a:p>
             <a:pPr indent="0" lvl="0" marL="0" rtl="0" algn="l">
@@ -7192,7 +7157,7 @@
         <p:spPr>
           <a:xfrm>
             <a:off x="311700" y="1152475"/>
-            <a:ext cx="8520600" cy="3416400"/>
+            <a:ext cx="8520600" cy="3920400"/>
           </a:xfrm>
           <a:prstGeom prst="rect">
             <a:avLst/>
@@ -7215,10 +7180,25 @@
               <a:buChar char="●"/>
             </a:pPr>
             <a:r>
-              <a:rPr lang="pt-BR"/>
-              <a:t>faça isso no repositório remoto.</a:t>
+              <a:rPr lang="pt-BR">
+                <a:solidFill>
+                  <a:schemeClr val="dk1"/>
+                </a:solidFill>
+              </a:rPr>
+              <a:t> Ramificar o seu projeto em 2 ou mais.</a:t>
             </a:r>
-            <a:endParaRPr/>
+            <a:br>
+              <a:rPr lang="pt-BR">
+                <a:solidFill>
+                  <a:schemeClr val="dk1"/>
+                </a:solidFill>
+              </a:rPr>
+            </a:br>
+            <a:endParaRPr>
+              <a:solidFill>
+                <a:schemeClr val="dk1"/>
+              </a:solidFill>
+            </a:endParaRPr>
           </a:p>
           <a:p>
             <a:pPr indent="-342900" lvl="0" marL="457200" rtl="0" algn="l">
@@ -7228,14 +7208,25 @@
               <a:spcAft>
                 <a:spcPts val="0"/>
               </a:spcAft>
+              <a:buClr>
+                <a:schemeClr val="dk1"/>
+              </a:buClr>
               <a:buSzPts val="1800"/>
               <a:buChar char="●"/>
             </a:pPr>
             <a:r>
-              <a:rPr lang="pt-BR"/>
-              <a:t>faz um pull no repositório local.</a:t>
+              <a:rPr lang="pt-BR">
+                <a:solidFill>
+                  <a:schemeClr val="dk1"/>
+                </a:solidFill>
+              </a:rPr>
+              <a:t>Imagine que o seu site está pronto, tudo funcionando perfeitamente, mas surge a necessidade de alterar algumas partes dele como forma de melhorá-lo.</a:t>
             </a:r>
-            <a:endParaRPr/>
+            <a:endParaRPr>
+              <a:solidFill>
+                <a:schemeClr val="dk1"/>
+              </a:solidFill>
+            </a:endParaRPr>
           </a:p>
           <a:p>
             <a:pPr indent="-342900" lvl="0" marL="457200" rtl="0" algn="l">
@@ -7245,14 +7236,53 @@
               <a:spcAft>
                 <a:spcPts val="0"/>
               </a:spcAft>
+              <a:buClr>
+                <a:schemeClr val="dk1"/>
+              </a:buClr>
               <a:buSzPts val="1800"/>
               <a:buChar char="●"/>
             </a:pPr>
             <a:r>
-              <a:rPr lang="pt-BR"/>
-              <a:t>acesse a branch para fazer alterações específicas</a:t>
+              <a:rPr lang="pt-BR">
+                <a:solidFill>
+                  <a:schemeClr val="dk1"/>
+                </a:solidFill>
+              </a:rPr>
+              <a:t>Você precisa manter estas alterações tanto no computador de casa quanto do trabalho.</a:t>
             </a:r>
-            <a:endParaRPr/>
+            <a:endParaRPr>
+              <a:solidFill>
+                <a:schemeClr val="dk1"/>
+              </a:solidFill>
+            </a:endParaRPr>
+          </a:p>
+          <a:p>
+            <a:pPr indent="-342900" lvl="0" marL="457200" rtl="0" algn="l">
+              <a:spcBef>
+                <a:spcPts val="0"/>
+              </a:spcBef>
+              <a:spcAft>
+                <a:spcPts val="0"/>
+              </a:spcAft>
+              <a:buClr>
+                <a:schemeClr val="dk1"/>
+              </a:buClr>
+              <a:buSzPts val="1800"/>
+              <a:buChar char="●"/>
+            </a:pPr>
+            <a:r>
+              <a:rPr lang="pt-BR">
+                <a:solidFill>
+                  <a:schemeClr val="dk1"/>
+                </a:solidFill>
+              </a:rPr>
+              <a:t>Com isso temos um problema, se você começa a alterar os arquivos em casa, para na metade da implementação, e precisa terminar no trabalho, como você iria comitar tudo pela metade e deixar o site incompleto?</a:t>
+            </a:r>
+            <a:endParaRPr>
+              <a:solidFill>
+                <a:schemeClr val="dk1"/>
+              </a:solidFill>
+            </a:endParaRPr>
           </a:p>
           <a:p>
             <a:pPr indent="0" lvl="0" marL="0" rtl="0" algn="l">
@@ -7260,45 +7290,14 @@
                 <a:spcPts val="1600"/>
               </a:spcBef>
               <a:spcAft>
-                <a:spcPts val="0"/>
+                <a:spcPts val="1600"/>
               </a:spcAft>
               <a:buNone/>
             </a:pPr>
             <a:r>
               <a:t/>
             </a:r>
-            <a:endParaRPr/>
-          </a:p>
-          <a:p>
-            <a:pPr indent="0" lvl="0" marL="0" rtl="0" algn="l">
-              <a:spcBef>
-                <a:spcPts val="1600"/>
-              </a:spcBef>
-              <a:spcAft>
-                <a:spcPts val="0"/>
-              </a:spcAft>
-              <a:buNone/>
-            </a:pPr>
-            <a:r>
-              <a:rPr lang="pt-BR"/>
-              <a:t>Use o comando git checkout &lt;nome-da-branch&gt;</a:t>
-            </a:r>
-            <a:endParaRPr/>
-          </a:p>
-          <a:p>
-            <a:pPr indent="0" lvl="0" marL="0" rtl="0" algn="l">
-              <a:spcBef>
-                <a:spcPts val="1600"/>
-              </a:spcBef>
-              <a:spcAft>
-                <a:spcPts val="1600"/>
-              </a:spcAft>
-              <a:buNone/>
-            </a:pPr>
-            <a:r>
-              <a:t/>
-            </a:r>
-            <a:endParaRPr/>
+            <a:endParaRPr b="1"/>
           </a:p>
         </p:txBody>
       </p:sp>
@@ -7357,11 +7356,31 @@
               <a:spcAft>
                 <a:spcPts val="0"/>
               </a:spcAft>
+              <a:buClr>
+                <a:schemeClr val="dk1"/>
+              </a:buClr>
+              <a:buSzPts val="1100"/>
+              <a:buFont typeface="Arial"/>
               <a:buNone/>
             </a:pPr>
             <a:r>
               <a:rPr lang="pt-BR"/>
-              <a:t>git merge	</a:t>
+              <a:t>Como criar Branches</a:t>
+            </a:r>
+            <a:endParaRPr/>
+          </a:p>
+          <a:p>
+            <a:pPr indent="0" lvl="0" marL="0" rtl="0" algn="l">
+              <a:spcBef>
+                <a:spcPts val="0"/>
+              </a:spcBef>
+              <a:spcAft>
+                <a:spcPts val="0"/>
+              </a:spcAft>
+              <a:buNone/>
+            </a:pPr>
+            <a:r>
+              <a:t/>
             </a:r>
             <a:endParaRPr/>
           </a:p>
@@ -7402,6 +7421,206 @@
             </a:pPr>
             <a:r>
               <a:rPr lang="pt-BR"/>
+              <a:t>faça isso no repositório remoto.</a:t>
+            </a:r>
+            <a:endParaRPr/>
+          </a:p>
+          <a:p>
+            <a:pPr indent="-342900" lvl="0" marL="457200" rtl="0" algn="l">
+              <a:spcBef>
+                <a:spcPts val="0"/>
+              </a:spcBef>
+              <a:spcAft>
+                <a:spcPts val="0"/>
+              </a:spcAft>
+              <a:buSzPts val="1800"/>
+              <a:buChar char="●"/>
+            </a:pPr>
+            <a:r>
+              <a:rPr lang="pt-BR"/>
+              <a:t>faz um pull no repositório local.</a:t>
+            </a:r>
+            <a:endParaRPr/>
+          </a:p>
+          <a:p>
+            <a:pPr indent="-342900" lvl="0" marL="457200" rtl="0" algn="l">
+              <a:spcBef>
+                <a:spcPts val="0"/>
+              </a:spcBef>
+              <a:spcAft>
+                <a:spcPts val="0"/>
+              </a:spcAft>
+              <a:buSzPts val="1800"/>
+              <a:buChar char="●"/>
+            </a:pPr>
+            <a:r>
+              <a:rPr lang="pt-BR"/>
+              <a:t>acesse a branch para fazer alterações específicas</a:t>
+            </a:r>
+            <a:endParaRPr/>
+          </a:p>
+          <a:p>
+            <a:pPr indent="0" lvl="0" marL="0" rtl="0" algn="l">
+              <a:spcBef>
+                <a:spcPts val="1600"/>
+              </a:spcBef>
+              <a:spcAft>
+                <a:spcPts val="0"/>
+              </a:spcAft>
+              <a:buNone/>
+            </a:pPr>
+            <a:r>
+              <a:t/>
+            </a:r>
+            <a:endParaRPr/>
+          </a:p>
+          <a:p>
+            <a:pPr indent="0" lvl="0" marL="0" rtl="0" algn="l">
+              <a:spcBef>
+                <a:spcPts val="1600"/>
+              </a:spcBef>
+              <a:spcAft>
+                <a:spcPts val="0"/>
+              </a:spcAft>
+              <a:buNone/>
+            </a:pPr>
+            <a:r>
+              <a:rPr lang="pt-BR"/>
+              <a:t>Use o comando </a:t>
+            </a:r>
+            <a:r>
+              <a:rPr b="1" lang="pt-BR">
+                <a:latin typeface="Courier New"/>
+                <a:ea typeface="Courier New"/>
+                <a:cs typeface="Courier New"/>
+                <a:sym typeface="Courier New"/>
+              </a:rPr>
+              <a:t>git checkout &lt;nome-da-branch&gt;</a:t>
+            </a:r>
+            <a:endParaRPr b="1">
+              <a:latin typeface="Courier New"/>
+              <a:ea typeface="Courier New"/>
+              <a:cs typeface="Courier New"/>
+              <a:sym typeface="Courier New"/>
+            </a:endParaRPr>
+          </a:p>
+          <a:p>
+            <a:pPr indent="0" lvl="0" marL="0" rtl="0" algn="l">
+              <a:spcBef>
+                <a:spcPts val="1600"/>
+              </a:spcBef>
+              <a:spcAft>
+                <a:spcPts val="1600"/>
+              </a:spcAft>
+              <a:buNone/>
+            </a:pPr>
+            <a:r>
+              <a:t/>
+            </a:r>
+            <a:endParaRPr/>
+          </a:p>
+        </p:txBody>
+      </p:sp>
+    </p:spTree>
+  </p:cSld>
+  <p:clrMapOvr>
+    <a:masterClrMapping/>
+  </p:clrMapOvr>
+</p:sld>
+</file>
+
+<file path=ppt/slides/slide9.xml><?xml version="1.0" encoding="utf-8"?>
+<p:sld xmlns:a="http://schemas.openxmlformats.org/drawingml/2006/main" xmlns:r="http://schemas.openxmlformats.org/officeDocument/2006/relationships" xmlns:mc="http://schemas.openxmlformats.org/markup-compatibility/2006" xmlns:mv="urn:schemas-microsoft-com:mac:vml" xmlns:p="http://schemas.openxmlformats.org/presentationml/2006/main" xmlns:c="http://schemas.openxmlformats.org/drawingml/2006/chart" xmlns:dgm="http://schemas.openxmlformats.org/drawingml/2006/diagram" xmlns:o="urn:schemas-microsoft-com:office:office" xmlns:v="urn:schemas-microsoft-com:vml" xmlns:pvml="urn:schemas-microsoft-com:office:powerpoint" xmlns:com="http://schemas.openxmlformats.org/drawingml/2006/compatibility" xmlns:p14="http://schemas.microsoft.com/office/powerpoint/2010/main" xmlns:p15="http://schemas.microsoft.com/office/powerpoint/2012/main">
+  <p:cSld>
+    <p:spTree>
+      <p:nvGrpSpPr>
+        <p:cNvPr id="101" name="Shape 101"/>
+        <p:cNvGrpSpPr/>
+        <p:nvPr/>
+      </p:nvGrpSpPr>
+      <p:grpSpPr>
+        <a:xfrm>
+          <a:off x="0" y="0"/>
+          <a:ext cx="0" cy="0"/>
+          <a:chOff x="0" y="0"/>
+          <a:chExt cx="0" cy="0"/>
+        </a:xfrm>
+      </p:grpSpPr>
+      <p:sp>
+        <p:nvSpPr>
+          <p:cNvPr id="102" name="Google Shape;102;p21"/>
+          <p:cNvSpPr txBox="1"/>
+          <p:nvPr>
+            <p:ph type="title"/>
+          </p:nvPr>
+        </p:nvSpPr>
+        <p:spPr>
+          <a:xfrm>
+            <a:off x="311700" y="445025"/>
+            <a:ext cx="8520600" cy="572700"/>
+          </a:xfrm>
+          <a:prstGeom prst="rect">
+            <a:avLst/>
+          </a:prstGeom>
+        </p:spPr>
+        <p:txBody>
+          <a:bodyPr anchorCtr="0" anchor="t" bIns="91425" lIns="91425" spcFirstLastPara="1" rIns="91425" wrap="square" tIns="91425">
+            <a:noAutofit/>
+          </a:bodyPr>
+          <a:lstStyle/>
+          <a:p>
+            <a:pPr indent="0" lvl="0" marL="0" rtl="0" algn="l">
+              <a:spcBef>
+                <a:spcPts val="0"/>
+              </a:spcBef>
+              <a:spcAft>
+                <a:spcPts val="0"/>
+              </a:spcAft>
+              <a:buNone/>
+            </a:pPr>
+            <a:r>
+              <a:rPr lang="pt-BR"/>
+              <a:t>git merge	</a:t>
+            </a:r>
+            <a:endParaRPr/>
+          </a:p>
+        </p:txBody>
+      </p:sp>
+      <p:sp>
+        <p:nvSpPr>
+          <p:cNvPr id="103" name="Google Shape;103;p21"/>
+          <p:cNvSpPr txBox="1"/>
+          <p:nvPr>
+            <p:ph idx="1" type="body"/>
+          </p:nvPr>
+        </p:nvSpPr>
+        <p:spPr>
+          <a:xfrm>
+            <a:off x="311700" y="1152475"/>
+            <a:ext cx="8520600" cy="3720300"/>
+          </a:xfrm>
+          <a:prstGeom prst="rect">
+            <a:avLst/>
+          </a:prstGeom>
+        </p:spPr>
+        <p:txBody>
+          <a:bodyPr anchorCtr="0" anchor="t" bIns="91425" lIns="91425" spcFirstLastPara="1" rIns="91425" wrap="square" tIns="91425">
+            <a:noAutofit/>
+          </a:bodyPr>
+          <a:lstStyle/>
+          <a:p>
+            <a:pPr indent="-342900" lvl="0" marL="457200" rtl="0" algn="l">
+              <a:spcBef>
+                <a:spcPts val="0"/>
+              </a:spcBef>
+              <a:spcAft>
+                <a:spcPts val="0"/>
+              </a:spcAft>
+              <a:buSzPts val="1800"/>
+              <a:buChar char="●"/>
+            </a:pPr>
+            <a:r>
+              <a:rPr lang="pt-BR"/>
               <a:t>Junta as alterações feitas numa branch para outra branch.</a:t>
             </a:r>
             <a:endParaRPr/>
@@ -7439,20 +7658,107 @@
             <a:endParaRPr/>
           </a:p>
           <a:p>
-            <a:pPr indent="0" lvl="0" marL="0" rtl="0" algn="l">
-              <a:spcBef>
-                <a:spcPts val="1600"/>
-              </a:spcBef>
-              <a:spcAft>
-                <a:spcPts val="0"/>
-              </a:spcAft>
-              <a:buNone/>
+            <a:pPr indent="-317500" lvl="1" marL="914400" rtl="0" algn="l">
+              <a:spcBef>
+                <a:spcPts val="0"/>
+              </a:spcBef>
+              <a:spcAft>
+                <a:spcPts val="0"/>
+              </a:spcAft>
+              <a:buSzPts val="1400"/>
+              <a:buChar char="○"/>
             </a:pPr>
             <a:r>
               <a:rPr lang="pt-BR"/>
-              <a:t>git merge nome-da-branch</a:t>
+              <a:t>se eu quero trazer as alterações da branch1 para a branch master eu tenho que estar denro da branch master.</a:t>
             </a:r>
             <a:endParaRPr/>
+          </a:p>
+          <a:p>
+            <a:pPr indent="-317500" lvl="1" marL="914400" rtl="0" algn="l">
+              <a:spcBef>
+                <a:spcPts val="0"/>
+              </a:spcBef>
+              <a:spcAft>
+                <a:spcPts val="0"/>
+              </a:spcAft>
+              <a:buSzPts val="1400"/>
+              <a:buChar char="○"/>
+            </a:pPr>
+            <a:r>
+              <a:t/>
+            </a:r>
+            <a:endParaRPr/>
+          </a:p>
+          <a:p>
+            <a:pPr indent="0" lvl="0" marL="0" rtl="0" algn="l">
+              <a:spcBef>
+                <a:spcPts val="1600"/>
+              </a:spcBef>
+              <a:spcAft>
+                <a:spcPts val="0"/>
+              </a:spcAft>
+              <a:buNone/>
+            </a:pPr>
+            <a:r>
+              <a:rPr b="1" lang="pt-BR">
+                <a:latin typeface="Courier New"/>
+                <a:ea typeface="Courier New"/>
+                <a:cs typeface="Courier New"/>
+                <a:sym typeface="Courier New"/>
+              </a:rPr>
+              <a:t>git checkout master</a:t>
+            </a:r>
+            <a:endParaRPr b="1">
+              <a:latin typeface="Courier New"/>
+              <a:ea typeface="Courier New"/>
+              <a:cs typeface="Courier New"/>
+              <a:sym typeface="Courier New"/>
+            </a:endParaRPr>
+          </a:p>
+          <a:p>
+            <a:pPr indent="0" lvl="0" marL="0" rtl="0" algn="l">
+              <a:spcBef>
+                <a:spcPts val="1600"/>
+              </a:spcBef>
+              <a:spcAft>
+                <a:spcPts val="0"/>
+              </a:spcAft>
+              <a:buNone/>
+            </a:pPr>
+            <a:r>
+              <a:rPr b="1" lang="pt-BR">
+                <a:latin typeface="Courier New"/>
+                <a:ea typeface="Courier New"/>
+                <a:cs typeface="Courier New"/>
+                <a:sym typeface="Courier New"/>
+              </a:rPr>
+              <a:t>git merg</a:t>
+            </a:r>
+            <a:r>
+              <a:rPr b="1" lang="pt-BR">
+                <a:latin typeface="Courier New"/>
+                <a:ea typeface="Courier New"/>
+                <a:cs typeface="Courier New"/>
+                <a:sym typeface="Courier New"/>
+              </a:rPr>
+              <a:t>e</a:t>
+            </a:r>
+            <a:r>
+              <a:rPr b="1" lang="pt-BR">
+                <a:latin typeface="Courier New"/>
+                <a:ea typeface="Courier New"/>
+                <a:cs typeface="Courier New"/>
+                <a:sym typeface="Courier New"/>
+              </a:rPr>
+              <a:t> branch1</a:t>
+            </a:r>
+            <a:endParaRPr b="1">
+              <a:latin typeface="Courier New"/>
+              <a:ea typeface="Courier New"/>
+              <a:cs typeface="Courier New"/>
+              <a:sym typeface="Courier New"/>
+            </a:endParaRPr>
           </a:p>
           <a:p>
             <a:pPr indent="0" lvl="0" marL="0" rtl="0" algn="l">

</xml_diff>